<commit_message>
prototype ppt pdf added
</commit_message>
<xml_diff>
--- a/SmartCrop Innovators Idea.pptx
+++ b/SmartCrop Innovators Idea.pptx
@@ -7543,7 +7543,7 @@
         <p:spPr>
           <a:xfrm>
             <a:off x="155400" y="1445669"/>
-            <a:ext cx="8833200" cy="2524669"/>
+            <a:ext cx="8833200" cy="3453433"/>
           </a:xfrm>
           <a:prstGeom prst="rect">
             <a:avLst/>
@@ -7697,10 +7697,10 @@
                   </a:schemeClr>
                 </a:solidFill>
               </a:rPr>
-              <a:t>Demo Video Link (3 Minutes) - </a:t>
+              <a:t>Demo Video Link - </a:t>
             </a:r>
             <a:r>
-              <a:rPr lang="en-GB" sz="1800" b="1" dirty="0">
+              <a:rPr lang="en-GB" sz="1100" b="1" dirty="0">
                 <a:solidFill>
                   <a:schemeClr val="accent3">
                     <a:lumMod val="75000"/>
@@ -7714,9 +7714,9 @@
                   </a:extLst>
                 </a:hlinkClick>
               </a:rPr>
-              <a:t>https://github.com/md-shahid-ansari/ai-driven-farm/blob/main/prototype_demo_video.mp4</a:t>
+              <a:t>https://drive.google.com/file/d/15bsQ74i2ff6F1iM82nZ03FvfuK7uTFBh/view?usp=drive_link</a:t>
             </a:r>
-            <a:endParaRPr sz="1800" b="1" dirty="0">
+            <a:endParaRPr sz="1100" b="1" dirty="0">
               <a:solidFill>
                 <a:schemeClr val="accent3">
                   <a:lumMod val="75000"/>

</xml_diff>